<commit_message>
Update debug and server logs to include additional game submission details; fix script source URLs in base.html
</commit_message>
<xml_diff>
--- a/daabase_design.pptx
+++ b/daabase_design.pptx
@@ -6,6 +6,7 @@
   </p:sldMasterIdLst>
   <p:sldIdLst>
     <p:sldId id="256" r:id="rId2"/>
+    <p:sldId id="257" r:id="rId3"/>
   </p:sldIdLst>
   <p:sldSz cx="12192000" cy="6858000"/>
   <p:notesSz cx="6858000" cy="9144000"/>
@@ -104,6 +105,11 @@
       </a:defRPr>
     </a:lvl9pPr>
   </p:defaultTextStyle>
+  <p:extLst>
+    <p:ext uri="{EFAFB233-063F-42B5-8137-9DF3F51BA10A}">
+      <p15:sldGuideLst xmlns:p15="http://schemas.microsoft.com/office/powerpoint/2012/main"/>
+    </p:ext>
+  </p:extLst>
 </p:presentation>
 </file>
 
@@ -254,7 +260,7 @@
           <a:p>
             <a:fld id="{36F19B24-6BD1-432A-A1B3-CE8A0FB3CF1A}" type="datetimeFigureOut">
               <a:rPr lang="en-US" smtClean="0"/>
-              <a:t>9/14/2024</a:t>
+              <a:t>9/15/2024</a:t>
             </a:fld>
             <a:endParaRPr lang="en-US"/>
           </a:p>
@@ -452,7 +458,7 @@
           <a:p>
             <a:fld id="{36F19B24-6BD1-432A-A1B3-CE8A0FB3CF1A}" type="datetimeFigureOut">
               <a:rPr lang="en-US" smtClean="0"/>
-              <a:t>9/14/2024</a:t>
+              <a:t>9/15/2024</a:t>
             </a:fld>
             <a:endParaRPr lang="en-US"/>
           </a:p>
@@ -660,7 +666,7 @@
           <a:p>
             <a:fld id="{36F19B24-6BD1-432A-A1B3-CE8A0FB3CF1A}" type="datetimeFigureOut">
               <a:rPr lang="en-US" smtClean="0"/>
-              <a:t>9/14/2024</a:t>
+              <a:t>9/15/2024</a:t>
             </a:fld>
             <a:endParaRPr lang="en-US"/>
           </a:p>
@@ -858,7 +864,7 @@
           <a:p>
             <a:fld id="{36F19B24-6BD1-432A-A1B3-CE8A0FB3CF1A}" type="datetimeFigureOut">
               <a:rPr lang="en-US" smtClean="0"/>
-              <a:t>9/14/2024</a:t>
+              <a:t>9/15/2024</a:t>
             </a:fld>
             <a:endParaRPr lang="en-US"/>
           </a:p>
@@ -1133,7 +1139,7 @@
           <a:p>
             <a:fld id="{36F19B24-6BD1-432A-A1B3-CE8A0FB3CF1A}" type="datetimeFigureOut">
               <a:rPr lang="en-US" smtClean="0"/>
-              <a:t>9/14/2024</a:t>
+              <a:t>9/15/2024</a:t>
             </a:fld>
             <a:endParaRPr lang="en-US"/>
           </a:p>
@@ -1398,7 +1404,7 @@
           <a:p>
             <a:fld id="{36F19B24-6BD1-432A-A1B3-CE8A0FB3CF1A}" type="datetimeFigureOut">
               <a:rPr lang="en-US" smtClean="0"/>
-              <a:t>9/14/2024</a:t>
+              <a:t>9/15/2024</a:t>
             </a:fld>
             <a:endParaRPr lang="en-US"/>
           </a:p>
@@ -1810,7 +1816,7 @@
           <a:p>
             <a:fld id="{36F19B24-6BD1-432A-A1B3-CE8A0FB3CF1A}" type="datetimeFigureOut">
               <a:rPr lang="en-US" smtClean="0"/>
-              <a:t>9/14/2024</a:t>
+              <a:t>9/15/2024</a:t>
             </a:fld>
             <a:endParaRPr lang="en-US"/>
           </a:p>
@@ -1951,7 +1957,7 @@
           <a:p>
             <a:fld id="{36F19B24-6BD1-432A-A1B3-CE8A0FB3CF1A}" type="datetimeFigureOut">
               <a:rPr lang="en-US" smtClean="0"/>
-              <a:t>9/14/2024</a:t>
+              <a:t>9/15/2024</a:t>
             </a:fld>
             <a:endParaRPr lang="en-US"/>
           </a:p>
@@ -2064,7 +2070,7 @@
           <a:p>
             <a:fld id="{36F19B24-6BD1-432A-A1B3-CE8A0FB3CF1A}" type="datetimeFigureOut">
               <a:rPr lang="en-US" smtClean="0"/>
-              <a:t>9/14/2024</a:t>
+              <a:t>9/15/2024</a:t>
             </a:fld>
             <a:endParaRPr lang="en-US"/>
           </a:p>
@@ -2375,7 +2381,7 @@
           <a:p>
             <a:fld id="{36F19B24-6BD1-432A-A1B3-CE8A0FB3CF1A}" type="datetimeFigureOut">
               <a:rPr lang="en-US" smtClean="0"/>
-              <a:t>9/14/2024</a:t>
+              <a:t>9/15/2024</a:t>
             </a:fld>
             <a:endParaRPr lang="en-US"/>
           </a:p>
@@ -2663,7 +2669,7 @@
           <a:p>
             <a:fld id="{36F19B24-6BD1-432A-A1B3-CE8A0FB3CF1A}" type="datetimeFigureOut">
               <a:rPr lang="en-US" smtClean="0"/>
-              <a:t>9/14/2024</a:t>
+              <a:t>9/15/2024</a:t>
             </a:fld>
             <a:endParaRPr lang="en-US"/>
           </a:p>
@@ -2904,7 +2910,7 @@
           <a:p>
             <a:fld id="{36F19B24-6BD1-432A-A1B3-CE8A0FB3CF1A}" type="datetimeFigureOut">
               <a:rPr lang="en-US" smtClean="0"/>
-              <a:t>9/14/2024</a:t>
+              <a:t>9/15/2024</a:t>
             </a:fld>
             <a:endParaRPr lang="en-US"/>
           </a:p>
@@ -3719,6 +3725,146 @@
     <p:extLst>
       <p:ext uri="{BB962C8B-B14F-4D97-AF65-F5344CB8AC3E}">
         <p14:creationId xmlns:p14="http://schemas.microsoft.com/office/powerpoint/2010/main" val="261218932"/>
+      </p:ext>
+    </p:extLst>
+  </p:cSld>
+  <p:clrMapOvr>
+    <a:masterClrMapping/>
+  </p:clrMapOvr>
+</p:sld>
+</file>
+
+<file path=ppt/slides/slide2.xml><?xml version="1.0" encoding="utf-8"?>
+<p:sld xmlns:a="http://schemas.openxmlformats.org/drawingml/2006/main" xmlns:r="http://schemas.openxmlformats.org/officeDocument/2006/relationships" xmlns:p="http://schemas.openxmlformats.org/presentationml/2006/main">
+  <p:cSld>
+    <p:spTree>
+      <p:nvGrpSpPr>
+        <p:cNvPr id="1" name=""/>
+        <p:cNvGrpSpPr/>
+        <p:nvPr/>
+      </p:nvGrpSpPr>
+      <p:grpSpPr>
+        <a:xfrm>
+          <a:off x="0" y="0"/>
+          <a:ext cx="0" cy="0"/>
+          <a:chOff x="0" y="0"/>
+          <a:chExt cx="0" cy="0"/>
+        </a:xfrm>
+      </p:grpSpPr>
+      <p:sp>
+        <p:nvSpPr>
+          <p:cNvPr id="4" name="TextBox 3">
+            <a:extLst>
+              <a:ext uri="{FF2B5EF4-FFF2-40B4-BE49-F238E27FC236}">
+                <a16:creationId xmlns:a16="http://schemas.microsoft.com/office/drawing/2014/main" id="{1401D6CC-78FF-8B15-167C-72E00A9E770C}"/>
+              </a:ext>
+            </a:extLst>
+          </p:cNvPr>
+          <p:cNvSpPr txBox="1"/>
+          <p:nvPr/>
+        </p:nvSpPr>
+        <p:spPr>
+          <a:xfrm>
+            <a:off x="1355154" y="453911"/>
+            <a:ext cx="6979701" cy="2585323"/>
+          </a:xfrm>
+          <a:prstGeom prst="rect">
+            <a:avLst/>
+          </a:prstGeom>
+          <a:noFill/>
+        </p:spPr>
+        <p:txBody>
+          <a:bodyPr wrap="square" rtlCol="0">
+            <a:spAutoFit/>
+          </a:bodyPr>
+          <a:lstStyle/>
+          <a:p>
+            <a:pPr marL="342900" indent="-342900">
+              <a:buAutoNum type="arabicParenR"/>
+            </a:pPr>
+            <a:r>
+              <a:rPr lang="en-US" dirty="0"/>
+              <a:t>Functionality for any bugs</a:t>
+            </a:r>
+          </a:p>
+          <a:p>
+            <a:pPr marL="800100" lvl="1" indent="-342900">
+              <a:buAutoNum type="arabicParenR"/>
+            </a:pPr>
+            <a:r>
+              <a:rPr lang="en-US"/>
+              <a:t>Program tests</a:t>
+            </a:r>
+          </a:p>
+          <a:p>
+            <a:pPr marL="800100" lvl="1" indent="-342900">
+              <a:buAutoNum type="arabicParenR"/>
+            </a:pPr>
+            <a:r>
+              <a:rPr lang="en-US" dirty="0"/>
+              <a:t>DEE Student tests</a:t>
+            </a:r>
+          </a:p>
+          <a:p>
+            <a:pPr marL="342900" indent="-342900">
+              <a:buAutoNum type="arabicParenR"/>
+            </a:pPr>
+            <a:r>
+              <a:rPr lang="en-US" dirty="0"/>
+              <a:t>Mechanism for daily words until the end of the quarter</a:t>
+            </a:r>
+          </a:p>
+          <a:p>
+            <a:pPr marL="342900" indent="-342900">
+              <a:buAutoNum type="arabicParenR"/>
+            </a:pPr>
+            <a:r>
+              <a:rPr lang="en-US" dirty="0"/>
+              <a:t>Award mechanism</a:t>
+            </a:r>
+          </a:p>
+          <a:p>
+            <a:pPr marL="800100" lvl="1" indent="-342900">
+              <a:buAutoNum type="arabicParenR"/>
+            </a:pPr>
+            <a:r>
+              <a:rPr lang="en-US" dirty="0"/>
+              <a:t>Weekly awards</a:t>
+            </a:r>
+          </a:p>
+          <a:p>
+            <a:pPr marL="800100" lvl="1" indent="-342900">
+              <a:buAutoNum type="arabicParenR"/>
+            </a:pPr>
+            <a:r>
+              <a:rPr lang="en-US" dirty="0"/>
+              <a:t>Streak buttons</a:t>
+            </a:r>
+          </a:p>
+          <a:p>
+            <a:pPr marL="342900" indent="-342900">
+              <a:buAutoNum type="arabicParenR"/>
+            </a:pPr>
+            <a:r>
+              <a:rPr lang="en-US" dirty="0"/>
+              <a:t>Appearance of the app</a:t>
+            </a:r>
+          </a:p>
+          <a:p>
+            <a:pPr marL="342900" indent="-342900">
+              <a:buAutoNum type="arabicParenR"/>
+            </a:pPr>
+            <a:r>
+              <a:rPr lang="en-US" dirty="0"/>
+              <a:t>Mechanism to verify CP students/faculty</a:t>
+            </a:r>
+          </a:p>
+        </p:txBody>
+      </p:sp>
+    </p:spTree>
+    <p:extLst>
+      <p:ext uri="{BB962C8B-B14F-4D97-AF65-F5344CB8AC3E}">
+        <p14:creationId xmlns:p14="http://schemas.microsoft.com/office/powerpoint/2010/main" val="2686450277"/>
       </p:ext>
     </p:extLst>
   </p:cSld>

</xml_diff>

<commit_message>
Add time tracking to game and guess submissions; create GuessTime model and update game time logic
</commit_message>
<xml_diff>
--- a/daabase_design.pptx
+++ b/daabase_design.pptx
@@ -3766,7 +3766,7 @@
         <p:spPr>
           <a:xfrm>
             <a:off x="1355154" y="453911"/>
-            <a:ext cx="6979701" cy="2585323"/>
+            <a:ext cx="6979701" cy="4247317"/>
           </a:xfrm>
           <a:prstGeom prst="rect">
             <a:avLst/>
@@ -3792,8 +3792,8 @@
               <a:buAutoNum type="arabicParenR"/>
             </a:pPr>
             <a:r>
-              <a:rPr lang="en-US"/>
-              <a:t>Program tests</a:t>
+              <a:rPr lang="en-US" dirty="0"/>
+              <a:t>Program tests (locally)</a:t>
             </a:r>
           </a:p>
           <a:p>
@@ -3802,6 +3802,15 @@
             </a:pPr>
             <a:r>
               <a:rPr lang="en-US" dirty="0"/>
+              <a:t>End to End test</a:t>
+            </a:r>
+          </a:p>
+          <a:p>
+            <a:pPr marL="800100" lvl="1" indent="-342900">
+              <a:buAutoNum type="arabicParenR"/>
+            </a:pPr>
+            <a:r>
+              <a:rPr lang="en-US" dirty="0"/>
               <a:t>DEE Student tests</a:t>
             </a:r>
           </a:p>
@@ -3815,11 +3824,43 @@
             </a:r>
           </a:p>
           <a:p>
+            <a:pPr marL="800100" lvl="1" indent="-342900">
+              <a:buAutoNum type="arabicParenR"/>
+            </a:pPr>
+            <a:r>
+              <a:rPr lang="en-US" dirty="0"/>
+              <a:t>Change everyday </a:t>
+            </a:r>
+          </a:p>
+          <a:p>
+            <a:pPr marL="800100" lvl="1" indent="-342900">
+              <a:buAutoNum type="arabicParenR"/>
+            </a:pPr>
+            <a:r>
+              <a:rPr lang="en-US" dirty="0"/>
+              <a:t>Same word for everyone</a:t>
+            </a:r>
+          </a:p>
+          <a:p>
             <a:pPr marL="342900" indent="-342900">
               <a:buAutoNum type="arabicParenR"/>
             </a:pPr>
             <a:r>
               <a:rPr lang="en-US" dirty="0"/>
+              <a:t>Get Domain (am I get sued </a:t>
+            </a:r>
+            <a:r>
+              <a:rPr lang="en-US" dirty="0" err="1"/>
+              <a:t>for,cloudflare</a:t>
+            </a:r>
+            <a:endParaRPr lang="en-US" dirty="0"/>
+          </a:p>
+          <a:p>
+            <a:pPr marL="342900" indent="-342900">
+              <a:buAutoNum type="arabicParenR"/>
+            </a:pPr>
+            <a:r>
+              <a:rPr lang="en-US" dirty="0"/>
               <a:t>Award mechanism</a:t>
             </a:r>
           </a:p>
@@ -3848,6 +3889,24 @@
             <a:r>
               <a:rPr lang="en-US" dirty="0"/>
               <a:t>Appearance of the app</a:t>
+            </a:r>
+          </a:p>
+          <a:p>
+            <a:pPr marL="800100" lvl="1" indent="-342900">
+              <a:buAutoNum type="arabicParenR"/>
+            </a:pPr>
+            <a:r>
+              <a:rPr lang="en-US" dirty="0"/>
+              <a:t>Everything</a:t>
+            </a:r>
+          </a:p>
+          <a:p>
+            <a:pPr marL="800100" lvl="1" indent="-342900">
+              <a:buAutoNum type="arabicParenR"/>
+            </a:pPr>
+            <a:r>
+              <a:rPr lang="en-US" dirty="0"/>
+              <a:t>Stats Tab</a:t>
             </a:r>
           </a:p>
           <a:p>

</xml_diff>